<commit_message>
- add traits and some holiday feeling
</commit_message>
<xml_diff>
--- a/Scala.pptx
+++ b/Scala.pptx
@@ -7,10 +7,11 @@
   <p:sldIdLst>
     <p:sldId id="256" r:id="rId2"/>
     <p:sldId id="257" r:id="rId3"/>
-    <p:sldId id="259" r:id="rId4"/>
-    <p:sldId id="260" r:id="rId5"/>
-    <p:sldId id="262" r:id="rId6"/>
-    <p:sldId id="261" r:id="rId7"/>
+    <p:sldId id="263" r:id="rId4"/>
+    <p:sldId id="259" r:id="rId5"/>
+    <p:sldId id="260" r:id="rId6"/>
+    <p:sldId id="262" r:id="rId7"/>
+    <p:sldId id="261" r:id="rId8"/>
   </p:sldIdLst>
   <p:sldSz cx="9144000" cy="6858000" type="screen4x3"/>
   <p:notesSz cx="6858000" cy="9144000"/>
@@ -293,7 +294,8 @@
           <a:p>
             <a:fld id="{019CE01B-3B9E-4A7F-A55B-653F84DA3CBA}" type="datetimeFigureOut">
               <a:rPr lang="en-US" smtClean="0"/>
-              <a:t>4/17/2016</a:t>
+              <a:pPr/>
+              <a:t>4/18/2016</a:t>
             </a:fld>
             <a:endParaRPr lang="en-US"/>
           </a:p>
@@ -335,6 +337,7 @@
           <a:p>
             <a:fld id="{ABD7AE9B-FCC5-4EA7-A6B4-B26DC566E1E4}" type="slidenum">
               <a:rPr lang="en-US" smtClean="0"/>
+              <a:pPr/>
               <a:t>‹#›</a:t>
             </a:fld>
             <a:endParaRPr lang="en-US"/>
@@ -458,7 +461,8 @@
           <a:p>
             <a:fld id="{019CE01B-3B9E-4A7F-A55B-653F84DA3CBA}" type="datetimeFigureOut">
               <a:rPr lang="en-US" smtClean="0"/>
-              <a:t>4/17/2016</a:t>
+              <a:pPr/>
+              <a:t>4/18/2016</a:t>
             </a:fld>
             <a:endParaRPr lang="en-US"/>
           </a:p>
@@ -500,6 +504,7 @@
           <a:p>
             <a:fld id="{ABD7AE9B-FCC5-4EA7-A6B4-B26DC566E1E4}" type="slidenum">
               <a:rPr lang="en-US" smtClean="0"/>
+              <a:pPr/>
               <a:t>‹#›</a:t>
             </a:fld>
             <a:endParaRPr lang="en-US"/>
@@ -633,7 +638,8 @@
           <a:p>
             <a:fld id="{019CE01B-3B9E-4A7F-A55B-653F84DA3CBA}" type="datetimeFigureOut">
               <a:rPr lang="en-US" smtClean="0"/>
-              <a:t>4/17/2016</a:t>
+              <a:pPr/>
+              <a:t>4/18/2016</a:t>
             </a:fld>
             <a:endParaRPr lang="en-US"/>
           </a:p>
@@ -675,6 +681,7 @@
           <a:p>
             <a:fld id="{ABD7AE9B-FCC5-4EA7-A6B4-B26DC566E1E4}" type="slidenum">
               <a:rPr lang="en-US" smtClean="0"/>
+              <a:pPr/>
               <a:t>‹#›</a:t>
             </a:fld>
             <a:endParaRPr lang="en-US"/>
@@ -798,7 +805,8 @@
           <a:p>
             <a:fld id="{019CE01B-3B9E-4A7F-A55B-653F84DA3CBA}" type="datetimeFigureOut">
               <a:rPr lang="en-US" smtClean="0"/>
-              <a:t>4/17/2016</a:t>
+              <a:pPr/>
+              <a:t>4/18/2016</a:t>
             </a:fld>
             <a:endParaRPr lang="en-US"/>
           </a:p>
@@ -840,6 +848,7 @@
           <a:p>
             <a:fld id="{ABD7AE9B-FCC5-4EA7-A6B4-B26DC566E1E4}" type="slidenum">
               <a:rPr lang="en-US" smtClean="0"/>
+              <a:pPr/>
               <a:t>‹#›</a:t>
             </a:fld>
             <a:endParaRPr lang="en-US"/>
@@ -1039,7 +1048,8 @@
           <a:p>
             <a:fld id="{019CE01B-3B9E-4A7F-A55B-653F84DA3CBA}" type="datetimeFigureOut">
               <a:rPr lang="en-US" smtClean="0"/>
-              <a:t>4/17/2016</a:t>
+              <a:pPr/>
+              <a:t>4/18/2016</a:t>
             </a:fld>
             <a:endParaRPr lang="en-US"/>
           </a:p>
@@ -1081,6 +1091,7 @@
           <a:p>
             <a:fld id="{ABD7AE9B-FCC5-4EA7-A6B4-B26DC566E1E4}" type="slidenum">
               <a:rPr lang="en-US" smtClean="0"/>
+              <a:pPr/>
               <a:t>‹#›</a:t>
             </a:fld>
             <a:endParaRPr lang="en-US"/>
@@ -1322,7 +1333,8 @@
           <a:p>
             <a:fld id="{019CE01B-3B9E-4A7F-A55B-653F84DA3CBA}" type="datetimeFigureOut">
               <a:rPr lang="en-US" smtClean="0"/>
-              <a:t>4/17/2016</a:t>
+              <a:pPr/>
+              <a:t>4/18/2016</a:t>
             </a:fld>
             <a:endParaRPr lang="en-US"/>
           </a:p>
@@ -1364,6 +1376,7 @@
           <a:p>
             <a:fld id="{ABD7AE9B-FCC5-4EA7-A6B4-B26DC566E1E4}" type="slidenum">
               <a:rPr lang="en-US" smtClean="0"/>
+              <a:pPr/>
               <a:t>‹#›</a:t>
             </a:fld>
             <a:endParaRPr lang="en-US"/>
@@ -1739,7 +1752,8 @@
           <a:p>
             <a:fld id="{019CE01B-3B9E-4A7F-A55B-653F84DA3CBA}" type="datetimeFigureOut">
               <a:rPr lang="en-US" smtClean="0"/>
-              <a:t>4/17/2016</a:t>
+              <a:pPr/>
+              <a:t>4/18/2016</a:t>
             </a:fld>
             <a:endParaRPr lang="en-US"/>
           </a:p>
@@ -1781,6 +1795,7 @@
           <a:p>
             <a:fld id="{ABD7AE9B-FCC5-4EA7-A6B4-B26DC566E1E4}" type="slidenum">
               <a:rPr lang="en-US" smtClean="0"/>
+              <a:pPr/>
               <a:t>‹#›</a:t>
             </a:fld>
             <a:endParaRPr lang="en-US"/>
@@ -1852,7 +1867,8 @@
           <a:p>
             <a:fld id="{019CE01B-3B9E-4A7F-A55B-653F84DA3CBA}" type="datetimeFigureOut">
               <a:rPr lang="en-US" smtClean="0"/>
-              <a:t>4/17/2016</a:t>
+              <a:pPr/>
+              <a:t>4/18/2016</a:t>
             </a:fld>
             <a:endParaRPr lang="en-US"/>
           </a:p>
@@ -1894,6 +1910,7 @@
           <a:p>
             <a:fld id="{ABD7AE9B-FCC5-4EA7-A6B4-B26DC566E1E4}" type="slidenum">
               <a:rPr lang="en-US" smtClean="0"/>
+              <a:pPr/>
               <a:t>‹#›</a:t>
             </a:fld>
             <a:endParaRPr lang="en-US"/>
@@ -1942,7 +1959,8 @@
           <a:p>
             <a:fld id="{019CE01B-3B9E-4A7F-A55B-653F84DA3CBA}" type="datetimeFigureOut">
               <a:rPr lang="en-US" smtClean="0"/>
-              <a:t>4/17/2016</a:t>
+              <a:pPr/>
+              <a:t>4/18/2016</a:t>
             </a:fld>
             <a:endParaRPr lang="en-US"/>
           </a:p>
@@ -1984,6 +2002,7 @@
           <a:p>
             <a:fld id="{ABD7AE9B-FCC5-4EA7-A6B4-B26DC566E1E4}" type="slidenum">
               <a:rPr lang="en-US" smtClean="0"/>
+              <a:pPr/>
               <a:t>‹#›</a:t>
             </a:fld>
             <a:endParaRPr lang="en-US"/>
@@ -2214,7 +2233,8 @@
           <a:p>
             <a:fld id="{019CE01B-3B9E-4A7F-A55B-653F84DA3CBA}" type="datetimeFigureOut">
               <a:rPr lang="en-US" smtClean="0"/>
-              <a:t>4/17/2016</a:t>
+              <a:pPr/>
+              <a:t>4/18/2016</a:t>
             </a:fld>
             <a:endParaRPr lang="en-US"/>
           </a:p>
@@ -2256,6 +2276,7 @@
           <a:p>
             <a:fld id="{ABD7AE9B-FCC5-4EA7-A6B4-B26DC566E1E4}" type="slidenum">
               <a:rPr lang="en-US" smtClean="0"/>
+              <a:pPr/>
               <a:t>‹#›</a:t>
             </a:fld>
             <a:endParaRPr lang="en-US"/>
@@ -2462,7 +2483,8 @@
           <a:p>
             <a:fld id="{019CE01B-3B9E-4A7F-A55B-653F84DA3CBA}" type="datetimeFigureOut">
               <a:rPr lang="en-US" smtClean="0"/>
-              <a:t>4/17/2016</a:t>
+              <a:pPr/>
+              <a:t>4/18/2016</a:t>
             </a:fld>
             <a:endParaRPr lang="en-US"/>
           </a:p>
@@ -2504,6 +2526,7 @@
           <a:p>
             <a:fld id="{ABD7AE9B-FCC5-4EA7-A6B4-B26DC566E1E4}" type="slidenum">
               <a:rPr lang="en-US" smtClean="0"/>
+              <a:pPr/>
               <a:t>‹#›</a:t>
             </a:fld>
             <a:endParaRPr lang="en-US"/>
@@ -2670,7 +2693,8 @@
           <a:p>
             <a:fld id="{019CE01B-3B9E-4A7F-A55B-653F84DA3CBA}" type="datetimeFigureOut">
               <a:rPr lang="en-US" smtClean="0"/>
-              <a:t>4/17/2016</a:t>
+              <a:pPr/>
+              <a:t>4/18/2016</a:t>
             </a:fld>
             <a:endParaRPr lang="en-US"/>
           </a:p>
@@ -2748,6 +2772,7 @@
           <a:p>
             <a:fld id="{ABD7AE9B-FCC5-4EA7-A6B4-B26DC566E1E4}" type="slidenum">
               <a:rPr lang="en-US" smtClean="0"/>
+              <a:pPr/>
               <a:t>‹#›</a:t>
             </a:fld>
             <a:endParaRPr lang="en-US"/>
@@ -3281,65 +3306,69 @@
           <a:p>
             <a:r>
               <a:rPr lang="en-US" dirty="0" smtClean="0"/>
-              <a:t>Basics: </a:t>
-            </a:r>
+              <a:t>Main Design Principles</a:t>
+            </a:r>
+            <a:endParaRPr lang="en-US" dirty="0"/>
+          </a:p>
+        </p:txBody>
+      </p:sp>
+      <p:sp>
+        <p:nvSpPr>
+          <p:cNvPr id="3" name="Content Placeholder 2"/>
+          <p:cNvSpPr>
+            <a:spLocks noGrp="1"/>
+          </p:cNvSpPr>
+          <p:nvPr>
+            <p:ph idx="1"/>
+          </p:nvPr>
+        </p:nvSpPr>
+        <p:spPr/>
+        <p:txBody>
+          <a:bodyPr/>
+          <a:lstStyle/>
+          <a:p>
+            <a:r>
+              <a:rPr lang="en-US" dirty="0" smtClean="0"/>
+              <a:t>Strive for immutability</a:t>
+            </a:r>
+          </a:p>
+          <a:p>
+            <a:pPr lvl="1"/>
             <a:r>
               <a:rPr lang="en-US" dirty="0" err="1" smtClean="0"/>
-              <a:t>Scala</a:t>
-            </a:r>
-            <a:r>
-              <a:rPr lang="en-US" dirty="0" smtClean="0"/>
-              <a:t> Beans</a:t>
-            </a:r>
+              <a:t>val</a:t>
+            </a:r>
+            <a:endParaRPr lang="en-US" dirty="0" smtClean="0"/>
+          </a:p>
+          <a:p>
+            <a:pPr lvl="1"/>
+            <a:r>
+              <a:rPr lang="en-US" dirty="0" smtClean="0"/>
+              <a:t>immutable collections</a:t>
+            </a:r>
+          </a:p>
+          <a:p>
+            <a:pPr lvl="1"/>
+            <a:r>
+              <a:rPr lang="en-US" dirty="0" smtClean="0"/>
+              <a:t>you can still work in a usual way, if you’re so inclined</a:t>
+            </a:r>
+          </a:p>
+          <a:p>
+            <a:r>
+              <a:rPr lang="en-US" dirty="0" smtClean="0"/>
+              <a:t>Everything is an expression</a:t>
+            </a:r>
+          </a:p>
+          <a:p>
+            <a:pPr lvl="1"/>
+            <a:r>
+              <a:rPr lang="en-US" dirty="0" smtClean="0"/>
+              <a:t>no ifs, no buts</a:t>
+            </a:r>
+          </a:p>
+          <a:p>
             <a:endParaRPr lang="en-US" dirty="0"/>
-          </a:p>
-        </p:txBody>
-      </p:sp>
-      <p:sp>
-        <p:nvSpPr>
-          <p:cNvPr id="3" name="Content Placeholder 2"/>
-          <p:cNvSpPr>
-            <a:spLocks noGrp="1"/>
-          </p:cNvSpPr>
-          <p:nvPr>
-            <p:ph idx="1"/>
-          </p:nvPr>
-        </p:nvSpPr>
-        <p:spPr/>
-        <p:txBody>
-          <a:bodyPr/>
-          <a:lstStyle/>
-          <a:p>
-            <a:r>
-              <a:rPr lang="en-US" dirty="0" smtClean="0"/>
-              <a:t>No need for </a:t>
-            </a:r>
-            <a:r>
-              <a:rPr lang="en-US" dirty="0" err="1" smtClean="0"/>
-              <a:t>accessors</a:t>
-            </a:r>
-            <a:r>
-              <a:rPr lang="en-US" dirty="0" smtClean="0"/>
-              <a:t>/</a:t>
-            </a:r>
-            <a:r>
-              <a:rPr lang="en-US" dirty="0" err="1" smtClean="0"/>
-              <a:t>mutators</a:t>
-            </a:r>
-            <a:endParaRPr lang="en-US" dirty="0" smtClean="0"/>
-          </a:p>
-          <a:p>
-            <a:pPr lvl="1"/>
-            <a:r>
-              <a:rPr lang="en-US" dirty="0" smtClean="0"/>
-              <a:t>Can be added on the fly</a:t>
-            </a:r>
-          </a:p>
-          <a:p>
-            <a:pPr>
-              <a:buNone/>
-            </a:pPr>
-            <a:endParaRPr lang="en-US" dirty="0" smtClean="0"/>
           </a:p>
         </p:txBody>
       </p:sp>
@@ -3385,7 +3414,15 @@
           <a:p>
             <a:r>
               <a:rPr lang="en-US" dirty="0" smtClean="0"/>
-              <a:t>Basics: Case Classes</a:t>
+              <a:t>Basics: </a:t>
+            </a:r>
+            <a:r>
+              <a:rPr lang="en-US" dirty="0" err="1" smtClean="0"/>
+              <a:t>Scala</a:t>
+            </a:r>
+            <a:r>
+              <a:rPr lang="en-US" dirty="0" smtClean="0"/>
+              <a:t> Beans</a:t>
             </a:r>
             <a:endParaRPr lang="en-US" dirty="0"/>
           </a:p>
@@ -3403,50 +3440,115 @@
         </p:nvSpPr>
         <p:spPr/>
         <p:txBody>
-          <a:bodyPr/>
-          <a:lstStyle/>
-          <a:p>
-            <a:r>
-              <a:rPr lang="en-US" dirty="0" smtClean="0"/>
-              <a:t>Immutable</a:t>
-            </a:r>
-          </a:p>
-          <a:p>
-            <a:r>
-              <a:rPr lang="en-US" dirty="0" smtClean="0"/>
-              <a:t>Provide some basic functionality</a:t>
+          <a:bodyPr>
+            <a:normAutofit lnSpcReduction="10000"/>
+          </a:bodyPr>
+          <a:lstStyle/>
+          <a:p>
+            <a:r>
+              <a:rPr lang="en-US" dirty="0" smtClean="0"/>
+              <a:t>Class (same old stuff, but POJOs are leaner</a:t>
             </a:r>
           </a:p>
           <a:p>
             <a:pPr lvl="1"/>
             <a:r>
+              <a:rPr lang="en-US" dirty="0" smtClean="0"/>
+              <a:t>No </a:t>
+            </a:r>
+            <a:r>
+              <a:rPr lang="en-US" dirty="0" smtClean="0"/>
+              <a:t>need for </a:t>
+            </a:r>
+            <a:r>
               <a:rPr lang="en-US" dirty="0" err="1" smtClean="0"/>
-              <a:t>toString</a:t>
-            </a:r>
-            <a:r>
-              <a:rPr lang="en-US" dirty="0" smtClean="0"/>
-              <a:t>()</a:t>
+              <a:t>accessors</a:t>
+            </a:r>
+            <a:r>
+              <a:rPr lang="en-US" dirty="0" smtClean="0"/>
+              <a:t>/</a:t>
+            </a:r>
+            <a:r>
+              <a:rPr lang="en-US" dirty="0" err="1" smtClean="0"/>
+              <a:t>mutator</a:t>
+            </a:r>
+            <a:r>
+              <a:rPr lang="en-US" dirty="0" smtClean="0"/>
+              <a:t> - can </a:t>
+            </a:r>
+            <a:r>
+              <a:rPr lang="en-US" dirty="0" smtClean="0"/>
+              <a:t>be added on the </a:t>
+            </a:r>
+            <a:r>
+              <a:rPr lang="en-US" dirty="0" smtClean="0"/>
+              <a:t>fly</a:t>
+            </a:r>
+          </a:p>
+          <a:p>
+            <a:r>
+              <a:rPr lang="en-US" dirty="0" smtClean="0"/>
+              <a:t>Object </a:t>
             </a:r>
           </a:p>
           <a:p>
             <a:pPr lvl="1"/>
             <a:r>
               <a:rPr lang="en-US" dirty="0" smtClean="0"/>
-              <a:t>copy()</a:t>
+              <a:t>singleton of a class</a:t>
             </a:r>
           </a:p>
           <a:p>
             <a:pPr lvl="1"/>
             <a:r>
               <a:rPr lang="en-US" dirty="0" smtClean="0"/>
-              <a:t>==</a:t>
-            </a:r>
-          </a:p>
-          <a:p>
-            <a:pPr>
-              <a:buNone/>
-            </a:pPr>
-            <a:endParaRPr lang="en-US" dirty="0"/>
+              <a:t>cute way of being static</a:t>
+            </a:r>
+          </a:p>
+          <a:p>
+            <a:r>
+              <a:rPr lang="en-US" dirty="0" smtClean="0"/>
+              <a:t>Trait (</a:t>
+            </a:r>
+            <a:r>
+              <a:rPr lang="en-US" dirty="0" smtClean="0"/>
+              <a:t>interface a-la java8)</a:t>
+            </a:r>
+          </a:p>
+          <a:p>
+            <a:pPr lvl="1"/>
+            <a:r>
+              <a:rPr lang="en-US" dirty="0" smtClean="0"/>
+              <a:t>Actually, rather a </a:t>
+            </a:r>
+            <a:r>
+              <a:rPr lang="en-US" dirty="0" err="1" smtClean="0"/>
+              <a:t>mixin</a:t>
+            </a:r>
+            <a:endParaRPr lang="en-US" dirty="0" smtClean="0"/>
+          </a:p>
+          <a:p>
+            <a:pPr lvl="1"/>
+            <a:r>
+              <a:rPr lang="en-US" smtClean="0"/>
+              <a:t>S</a:t>
+            </a:r>
+            <a:r>
+              <a:rPr lang="en-US" smtClean="0"/>
+              <a:t>upports </a:t>
+            </a:r>
+            <a:r>
+              <a:rPr lang="en-US" dirty="0" smtClean="0"/>
+              <a:t>inheritance of state</a:t>
+            </a:r>
+          </a:p>
+          <a:p>
+            <a:pPr lvl="1"/>
+            <a:endParaRPr lang="en-US" dirty="0" smtClean="0"/>
+          </a:p>
+          <a:p>
+            <a:pPr lvl="1"/>
+            <a:endParaRPr lang="en-US" dirty="0" smtClean="0"/>
           </a:p>
         </p:txBody>
       </p:sp>
@@ -3492,72 +3594,62 @@
           <a:p>
             <a:r>
               <a:rPr lang="en-US" dirty="0" smtClean="0"/>
-              <a:t>Basics: </a:t>
-            </a:r>
+              <a:t>Basics: Case Classes</a:t>
+            </a:r>
+            <a:endParaRPr lang="en-US" dirty="0"/>
+          </a:p>
+        </p:txBody>
+      </p:sp>
+      <p:sp>
+        <p:nvSpPr>
+          <p:cNvPr id="3" name="Content Placeholder 2"/>
+          <p:cNvSpPr>
+            <a:spLocks noGrp="1"/>
+          </p:cNvSpPr>
+          <p:nvPr>
+            <p:ph idx="1"/>
+          </p:nvPr>
+        </p:nvSpPr>
+        <p:spPr/>
+        <p:txBody>
+          <a:bodyPr/>
+          <a:lstStyle/>
+          <a:p>
+            <a:r>
+              <a:rPr lang="en-US" dirty="0" smtClean="0"/>
+              <a:t>Immutable</a:t>
+            </a:r>
+          </a:p>
+          <a:p>
+            <a:r>
+              <a:rPr lang="en-US" dirty="0" smtClean="0"/>
+              <a:t>Provide some basic functionality</a:t>
+            </a:r>
+          </a:p>
+          <a:p>
+            <a:pPr lvl="1"/>
             <a:r>
               <a:rPr lang="en-US" dirty="0" err="1" smtClean="0"/>
-              <a:t>Tuple</a:t>
-            </a:r>
-            <a:endParaRPr lang="en-US" dirty="0"/>
-          </a:p>
-        </p:txBody>
-      </p:sp>
-      <p:sp>
-        <p:nvSpPr>
-          <p:cNvPr id="3" name="Content Placeholder 2"/>
-          <p:cNvSpPr>
-            <a:spLocks noGrp="1"/>
-          </p:cNvSpPr>
-          <p:nvPr>
-            <p:ph idx="1"/>
-          </p:nvPr>
-        </p:nvSpPr>
-        <p:spPr/>
-        <p:txBody>
-          <a:bodyPr/>
-          <a:lstStyle/>
-          <a:p>
-            <a:r>
-              <a:rPr lang="en-US" dirty="0"/>
-              <a:t>immutable sequence of values of multiple </a:t>
-            </a:r>
-            <a:r>
-              <a:rPr lang="en-US" dirty="0" smtClean="0"/>
-              <a:t>types</a:t>
-            </a:r>
-          </a:p>
-          <a:p>
-            <a:pPr>
-              <a:buNone/>
-            </a:pPr>
-            <a:endParaRPr lang="en-US" dirty="0"/>
-          </a:p>
-          <a:p>
-            <a:pPr>
-              <a:buNone/>
-            </a:pPr>
-            <a:r>
-              <a:rPr lang="en-US" b="1" dirty="0"/>
-              <a:t>val</a:t>
-            </a:r>
-            <a:r>
-              <a:rPr lang="en-US" dirty="0" smtClean="0"/>
-              <a:t>   idUsername </a:t>
-            </a:r>
-            <a:r>
-              <a:rPr lang="en-US" b="1" dirty="0"/>
-              <a:t>=</a:t>
-            </a:r>
-            <a:r>
-              <a:rPr lang="en-US" dirty="0" smtClean="0"/>
-              <a:t> (123, “VasjaBu")</a:t>
-            </a:r>
-          </a:p>
-          <a:p>
-            <a:pPr>
-              <a:buNone/>
-            </a:pPr>
-            <a:endParaRPr lang="en-US" dirty="0"/>
+              <a:t>toString</a:t>
+            </a:r>
+            <a:r>
+              <a:rPr lang="en-US" dirty="0" smtClean="0"/>
+              <a:t>()</a:t>
+            </a:r>
+          </a:p>
+          <a:p>
+            <a:pPr lvl="1"/>
+            <a:r>
+              <a:rPr lang="en-US" dirty="0" smtClean="0"/>
+              <a:t>copy()</a:t>
+            </a:r>
+          </a:p>
+          <a:p>
+            <a:pPr lvl="1"/>
+            <a:r>
+              <a:rPr lang="en-US" dirty="0" smtClean="0"/>
+              <a:t>==</a:t>
+            </a:r>
           </a:p>
           <a:p>
             <a:pPr>
@@ -3576,6 +3668,123 @@
 </file>
 
 <file path=ppt/slides/slide6.xml><?xml version="1.0" encoding="utf-8"?>
+<p:sld xmlns:a="http://schemas.openxmlformats.org/drawingml/2006/main" xmlns:r="http://schemas.openxmlformats.org/officeDocument/2006/relationships" xmlns:p="http://schemas.openxmlformats.org/presentationml/2006/main">
+  <p:cSld>
+    <p:spTree>
+      <p:nvGrpSpPr>
+        <p:cNvPr id="1" name=""/>
+        <p:cNvGrpSpPr/>
+        <p:nvPr/>
+      </p:nvGrpSpPr>
+      <p:grpSpPr>
+        <a:xfrm>
+          <a:off x="0" y="0"/>
+          <a:ext cx="0" cy="0"/>
+          <a:chOff x="0" y="0"/>
+          <a:chExt cx="0" cy="0"/>
+        </a:xfrm>
+      </p:grpSpPr>
+      <p:sp>
+        <p:nvSpPr>
+          <p:cNvPr id="2" name="Title 1"/>
+          <p:cNvSpPr>
+            <a:spLocks noGrp="1"/>
+          </p:cNvSpPr>
+          <p:nvPr>
+            <p:ph type="title"/>
+          </p:nvPr>
+        </p:nvSpPr>
+        <p:spPr/>
+        <p:txBody>
+          <a:bodyPr/>
+          <a:lstStyle/>
+          <a:p>
+            <a:r>
+              <a:rPr lang="en-US" dirty="0" smtClean="0"/>
+              <a:t>Basics: </a:t>
+            </a:r>
+            <a:r>
+              <a:rPr lang="en-US" dirty="0" err="1" smtClean="0"/>
+              <a:t>Tuple</a:t>
+            </a:r>
+            <a:endParaRPr lang="en-US" dirty="0"/>
+          </a:p>
+        </p:txBody>
+      </p:sp>
+      <p:sp>
+        <p:nvSpPr>
+          <p:cNvPr id="3" name="Content Placeholder 2"/>
+          <p:cNvSpPr>
+            <a:spLocks noGrp="1"/>
+          </p:cNvSpPr>
+          <p:nvPr>
+            <p:ph idx="1"/>
+          </p:nvPr>
+        </p:nvSpPr>
+        <p:spPr/>
+        <p:txBody>
+          <a:bodyPr/>
+          <a:lstStyle/>
+          <a:p>
+            <a:r>
+              <a:rPr lang="en-US" dirty="0"/>
+              <a:t>immutable sequence of values of multiple </a:t>
+            </a:r>
+            <a:r>
+              <a:rPr lang="en-US" dirty="0" smtClean="0"/>
+              <a:t>types</a:t>
+            </a:r>
+          </a:p>
+          <a:p>
+            <a:pPr>
+              <a:buNone/>
+            </a:pPr>
+            <a:endParaRPr lang="en-US" dirty="0"/>
+          </a:p>
+          <a:p>
+            <a:pPr>
+              <a:buNone/>
+            </a:pPr>
+            <a:r>
+              <a:rPr lang="en-US" b="1" dirty="0"/>
+              <a:t>val</a:t>
+            </a:r>
+            <a:r>
+              <a:rPr lang="en-US" dirty="0" smtClean="0"/>
+              <a:t>   idUsername </a:t>
+            </a:r>
+            <a:r>
+              <a:rPr lang="en-US" b="1" dirty="0"/>
+              <a:t>=</a:t>
+            </a:r>
+            <a:r>
+              <a:rPr lang="en-US" dirty="0" smtClean="0"/>
+              <a:t> (123, “VasjaBu")</a:t>
+            </a:r>
+          </a:p>
+          <a:p>
+            <a:pPr>
+              <a:buNone/>
+            </a:pPr>
+            <a:endParaRPr lang="en-US" dirty="0"/>
+          </a:p>
+          <a:p>
+            <a:pPr>
+              <a:buNone/>
+            </a:pPr>
+            <a:endParaRPr lang="en-US" dirty="0"/>
+          </a:p>
+        </p:txBody>
+      </p:sp>
+    </p:spTree>
+  </p:cSld>
+  <p:clrMapOvr>
+    <a:masterClrMapping/>
+  </p:clrMapOvr>
+</p:sld>
+</file>
+
+<file path=ppt/slides/slide7.xml><?xml version="1.0" encoding="utf-8"?>
 <p:sld xmlns:a="http://schemas.openxmlformats.org/drawingml/2006/main" xmlns:r="http://schemas.openxmlformats.org/officeDocument/2006/relationships" xmlns:p="http://schemas.openxmlformats.org/presentationml/2006/main">
   <p:cSld>
     <p:spTree>

</xml_diff>

<commit_message>
- Some more examples - Some more slides
</commit_message>
<xml_diff>
--- a/Scala.pptx
+++ b/Scala.pptx
@@ -6,12 +6,17 @@
   </p:sldMasterIdLst>
   <p:sldIdLst>
     <p:sldId id="256" r:id="rId2"/>
-    <p:sldId id="257" r:id="rId3"/>
-    <p:sldId id="263" r:id="rId4"/>
+    <p:sldId id="258" r:id="rId3"/>
+    <p:sldId id="257" r:id="rId4"/>
     <p:sldId id="259" r:id="rId5"/>
     <p:sldId id="260" r:id="rId6"/>
-    <p:sldId id="262" r:id="rId7"/>
-    <p:sldId id="261" r:id="rId8"/>
+    <p:sldId id="261" r:id="rId7"/>
+    <p:sldId id="263" r:id="rId8"/>
+    <p:sldId id="266" r:id="rId9"/>
+    <p:sldId id="264" r:id="rId10"/>
+    <p:sldId id="265" r:id="rId11"/>
+    <p:sldId id="267" r:id="rId12"/>
+    <p:sldId id="268" r:id="rId13"/>
   </p:sldIdLst>
   <p:sldSz cx="9144000" cy="6858000" type="screen4x3"/>
   <p:notesSz cx="6858000" cy="9144000"/>
@@ -292,10 +297,9 @@
           <a:bodyPr/>
           <a:lstStyle/>
           <a:p>
-            <a:fld id="{019CE01B-3B9E-4A7F-A55B-653F84DA3CBA}" type="datetimeFigureOut">
-              <a:rPr lang="en-US" smtClean="0"/>
-              <a:pPr/>
-              <a:t>4/18/2016</a:t>
+            <a:fld id="{6094FE82-722D-421B-BB2B-D10D66F0ABDE}" type="datetimeFigureOut">
+              <a:rPr lang="en-US" smtClean="0"/>
+              <a:t>5/1/2016</a:t>
             </a:fld>
             <a:endParaRPr lang="en-US"/>
           </a:p>
@@ -335,9 +339,8 @@
           <a:bodyPr/>
           <a:lstStyle/>
           <a:p>
-            <a:fld id="{ABD7AE9B-FCC5-4EA7-A6B4-B26DC566E1E4}" type="slidenum">
-              <a:rPr lang="en-US" smtClean="0"/>
-              <a:pPr/>
+            <a:fld id="{8B2E62DC-5ACB-4AD4-BAE6-906CF64556E6}" type="slidenum">
+              <a:rPr lang="en-US" smtClean="0"/>
               <a:t>‹#›</a:t>
             </a:fld>
             <a:endParaRPr lang="en-US"/>
@@ -459,10 +462,9 @@
           <a:bodyPr/>
           <a:lstStyle/>
           <a:p>
-            <a:fld id="{019CE01B-3B9E-4A7F-A55B-653F84DA3CBA}" type="datetimeFigureOut">
-              <a:rPr lang="en-US" smtClean="0"/>
-              <a:pPr/>
-              <a:t>4/18/2016</a:t>
+            <a:fld id="{6094FE82-722D-421B-BB2B-D10D66F0ABDE}" type="datetimeFigureOut">
+              <a:rPr lang="en-US" smtClean="0"/>
+              <a:t>5/1/2016</a:t>
             </a:fld>
             <a:endParaRPr lang="en-US"/>
           </a:p>
@@ -502,9 +504,8 @@
           <a:bodyPr/>
           <a:lstStyle/>
           <a:p>
-            <a:fld id="{ABD7AE9B-FCC5-4EA7-A6B4-B26DC566E1E4}" type="slidenum">
-              <a:rPr lang="en-US" smtClean="0"/>
-              <a:pPr/>
+            <a:fld id="{8B2E62DC-5ACB-4AD4-BAE6-906CF64556E6}" type="slidenum">
+              <a:rPr lang="en-US" smtClean="0"/>
               <a:t>‹#›</a:t>
             </a:fld>
             <a:endParaRPr lang="en-US"/>
@@ -636,10 +637,9 @@
           <a:bodyPr/>
           <a:lstStyle/>
           <a:p>
-            <a:fld id="{019CE01B-3B9E-4A7F-A55B-653F84DA3CBA}" type="datetimeFigureOut">
-              <a:rPr lang="en-US" smtClean="0"/>
-              <a:pPr/>
-              <a:t>4/18/2016</a:t>
+            <a:fld id="{6094FE82-722D-421B-BB2B-D10D66F0ABDE}" type="datetimeFigureOut">
+              <a:rPr lang="en-US" smtClean="0"/>
+              <a:t>5/1/2016</a:t>
             </a:fld>
             <a:endParaRPr lang="en-US"/>
           </a:p>
@@ -679,9 +679,8 @@
           <a:bodyPr/>
           <a:lstStyle/>
           <a:p>
-            <a:fld id="{ABD7AE9B-FCC5-4EA7-A6B4-B26DC566E1E4}" type="slidenum">
-              <a:rPr lang="en-US" smtClean="0"/>
-              <a:pPr/>
+            <a:fld id="{8B2E62DC-5ACB-4AD4-BAE6-906CF64556E6}" type="slidenum">
+              <a:rPr lang="en-US" smtClean="0"/>
               <a:t>‹#›</a:t>
             </a:fld>
             <a:endParaRPr lang="en-US"/>
@@ -803,10 +802,9 @@
           <a:bodyPr/>
           <a:lstStyle/>
           <a:p>
-            <a:fld id="{019CE01B-3B9E-4A7F-A55B-653F84DA3CBA}" type="datetimeFigureOut">
-              <a:rPr lang="en-US" smtClean="0"/>
-              <a:pPr/>
-              <a:t>4/18/2016</a:t>
+            <a:fld id="{6094FE82-722D-421B-BB2B-D10D66F0ABDE}" type="datetimeFigureOut">
+              <a:rPr lang="en-US" smtClean="0"/>
+              <a:t>5/1/2016</a:t>
             </a:fld>
             <a:endParaRPr lang="en-US"/>
           </a:p>
@@ -846,9 +844,8 @@
           <a:bodyPr/>
           <a:lstStyle/>
           <a:p>
-            <a:fld id="{ABD7AE9B-FCC5-4EA7-A6B4-B26DC566E1E4}" type="slidenum">
-              <a:rPr lang="en-US" smtClean="0"/>
-              <a:pPr/>
+            <a:fld id="{8B2E62DC-5ACB-4AD4-BAE6-906CF64556E6}" type="slidenum">
+              <a:rPr lang="en-US" smtClean="0"/>
               <a:t>‹#›</a:t>
             </a:fld>
             <a:endParaRPr lang="en-US"/>
@@ -1046,10 +1043,9 @@
           <a:bodyPr/>
           <a:lstStyle/>
           <a:p>
-            <a:fld id="{019CE01B-3B9E-4A7F-A55B-653F84DA3CBA}" type="datetimeFigureOut">
-              <a:rPr lang="en-US" smtClean="0"/>
-              <a:pPr/>
-              <a:t>4/18/2016</a:t>
+            <a:fld id="{6094FE82-722D-421B-BB2B-D10D66F0ABDE}" type="datetimeFigureOut">
+              <a:rPr lang="en-US" smtClean="0"/>
+              <a:t>5/1/2016</a:t>
             </a:fld>
             <a:endParaRPr lang="en-US"/>
           </a:p>
@@ -1089,9 +1085,8 @@
           <a:bodyPr/>
           <a:lstStyle/>
           <a:p>
-            <a:fld id="{ABD7AE9B-FCC5-4EA7-A6B4-B26DC566E1E4}" type="slidenum">
-              <a:rPr lang="en-US" smtClean="0"/>
-              <a:pPr/>
+            <a:fld id="{8B2E62DC-5ACB-4AD4-BAE6-906CF64556E6}" type="slidenum">
+              <a:rPr lang="en-US" smtClean="0"/>
               <a:t>‹#›</a:t>
             </a:fld>
             <a:endParaRPr lang="en-US"/>
@@ -1331,10 +1326,9 @@
           <a:bodyPr/>
           <a:lstStyle/>
           <a:p>
-            <a:fld id="{019CE01B-3B9E-4A7F-A55B-653F84DA3CBA}" type="datetimeFigureOut">
-              <a:rPr lang="en-US" smtClean="0"/>
-              <a:pPr/>
-              <a:t>4/18/2016</a:t>
+            <a:fld id="{6094FE82-722D-421B-BB2B-D10D66F0ABDE}" type="datetimeFigureOut">
+              <a:rPr lang="en-US" smtClean="0"/>
+              <a:t>5/1/2016</a:t>
             </a:fld>
             <a:endParaRPr lang="en-US"/>
           </a:p>
@@ -1374,9 +1368,8 @@
           <a:bodyPr/>
           <a:lstStyle/>
           <a:p>
-            <a:fld id="{ABD7AE9B-FCC5-4EA7-A6B4-B26DC566E1E4}" type="slidenum">
-              <a:rPr lang="en-US" smtClean="0"/>
-              <a:pPr/>
+            <a:fld id="{8B2E62DC-5ACB-4AD4-BAE6-906CF64556E6}" type="slidenum">
+              <a:rPr lang="en-US" smtClean="0"/>
               <a:t>‹#›</a:t>
             </a:fld>
             <a:endParaRPr lang="en-US"/>
@@ -1750,10 +1743,9 @@
           <a:bodyPr/>
           <a:lstStyle/>
           <a:p>
-            <a:fld id="{019CE01B-3B9E-4A7F-A55B-653F84DA3CBA}" type="datetimeFigureOut">
-              <a:rPr lang="en-US" smtClean="0"/>
-              <a:pPr/>
-              <a:t>4/18/2016</a:t>
+            <a:fld id="{6094FE82-722D-421B-BB2B-D10D66F0ABDE}" type="datetimeFigureOut">
+              <a:rPr lang="en-US" smtClean="0"/>
+              <a:t>5/1/2016</a:t>
             </a:fld>
             <a:endParaRPr lang="en-US"/>
           </a:p>
@@ -1793,9 +1785,8 @@
           <a:bodyPr/>
           <a:lstStyle/>
           <a:p>
-            <a:fld id="{ABD7AE9B-FCC5-4EA7-A6B4-B26DC566E1E4}" type="slidenum">
-              <a:rPr lang="en-US" smtClean="0"/>
-              <a:pPr/>
+            <a:fld id="{8B2E62DC-5ACB-4AD4-BAE6-906CF64556E6}" type="slidenum">
+              <a:rPr lang="en-US" smtClean="0"/>
               <a:t>‹#›</a:t>
             </a:fld>
             <a:endParaRPr lang="en-US"/>
@@ -1865,10 +1856,9 @@
           <a:bodyPr/>
           <a:lstStyle/>
           <a:p>
-            <a:fld id="{019CE01B-3B9E-4A7F-A55B-653F84DA3CBA}" type="datetimeFigureOut">
-              <a:rPr lang="en-US" smtClean="0"/>
-              <a:pPr/>
-              <a:t>4/18/2016</a:t>
+            <a:fld id="{6094FE82-722D-421B-BB2B-D10D66F0ABDE}" type="datetimeFigureOut">
+              <a:rPr lang="en-US" smtClean="0"/>
+              <a:t>5/1/2016</a:t>
             </a:fld>
             <a:endParaRPr lang="en-US"/>
           </a:p>
@@ -1908,9 +1898,8 @@
           <a:bodyPr/>
           <a:lstStyle/>
           <a:p>
-            <a:fld id="{ABD7AE9B-FCC5-4EA7-A6B4-B26DC566E1E4}" type="slidenum">
-              <a:rPr lang="en-US" smtClean="0"/>
-              <a:pPr/>
+            <a:fld id="{8B2E62DC-5ACB-4AD4-BAE6-906CF64556E6}" type="slidenum">
+              <a:rPr lang="en-US" smtClean="0"/>
               <a:t>‹#›</a:t>
             </a:fld>
             <a:endParaRPr lang="en-US"/>
@@ -1957,10 +1946,9 @@
           <a:bodyPr/>
           <a:lstStyle/>
           <a:p>
-            <a:fld id="{019CE01B-3B9E-4A7F-A55B-653F84DA3CBA}" type="datetimeFigureOut">
-              <a:rPr lang="en-US" smtClean="0"/>
-              <a:pPr/>
-              <a:t>4/18/2016</a:t>
+            <a:fld id="{6094FE82-722D-421B-BB2B-D10D66F0ABDE}" type="datetimeFigureOut">
+              <a:rPr lang="en-US" smtClean="0"/>
+              <a:t>5/1/2016</a:t>
             </a:fld>
             <a:endParaRPr lang="en-US"/>
           </a:p>
@@ -2000,9 +1988,8 @@
           <a:bodyPr/>
           <a:lstStyle/>
           <a:p>
-            <a:fld id="{ABD7AE9B-FCC5-4EA7-A6B4-B26DC566E1E4}" type="slidenum">
-              <a:rPr lang="en-US" smtClean="0"/>
-              <a:pPr/>
+            <a:fld id="{8B2E62DC-5ACB-4AD4-BAE6-906CF64556E6}" type="slidenum">
+              <a:rPr lang="en-US" smtClean="0"/>
               <a:t>‹#›</a:t>
             </a:fld>
             <a:endParaRPr lang="en-US"/>
@@ -2231,10 +2218,9 @@
           <a:bodyPr/>
           <a:lstStyle/>
           <a:p>
-            <a:fld id="{019CE01B-3B9E-4A7F-A55B-653F84DA3CBA}" type="datetimeFigureOut">
-              <a:rPr lang="en-US" smtClean="0"/>
-              <a:pPr/>
-              <a:t>4/18/2016</a:t>
+            <a:fld id="{6094FE82-722D-421B-BB2B-D10D66F0ABDE}" type="datetimeFigureOut">
+              <a:rPr lang="en-US" smtClean="0"/>
+              <a:t>5/1/2016</a:t>
             </a:fld>
             <a:endParaRPr lang="en-US"/>
           </a:p>
@@ -2274,9 +2260,8 @@
           <a:bodyPr/>
           <a:lstStyle/>
           <a:p>
-            <a:fld id="{ABD7AE9B-FCC5-4EA7-A6B4-B26DC566E1E4}" type="slidenum">
-              <a:rPr lang="en-US" smtClean="0"/>
-              <a:pPr/>
+            <a:fld id="{8B2E62DC-5ACB-4AD4-BAE6-906CF64556E6}" type="slidenum">
+              <a:rPr lang="en-US" smtClean="0"/>
               <a:t>‹#›</a:t>
             </a:fld>
             <a:endParaRPr lang="en-US"/>
@@ -2481,10 +2466,9 @@
           <a:bodyPr/>
           <a:lstStyle/>
           <a:p>
-            <a:fld id="{019CE01B-3B9E-4A7F-A55B-653F84DA3CBA}" type="datetimeFigureOut">
-              <a:rPr lang="en-US" smtClean="0"/>
-              <a:pPr/>
-              <a:t>4/18/2016</a:t>
+            <a:fld id="{6094FE82-722D-421B-BB2B-D10D66F0ABDE}" type="datetimeFigureOut">
+              <a:rPr lang="en-US" smtClean="0"/>
+              <a:t>5/1/2016</a:t>
             </a:fld>
             <a:endParaRPr lang="en-US"/>
           </a:p>
@@ -2524,9 +2508,8 @@
           <a:bodyPr/>
           <a:lstStyle/>
           <a:p>
-            <a:fld id="{ABD7AE9B-FCC5-4EA7-A6B4-B26DC566E1E4}" type="slidenum">
-              <a:rPr lang="en-US" smtClean="0"/>
-              <a:pPr/>
+            <a:fld id="{8B2E62DC-5ACB-4AD4-BAE6-906CF64556E6}" type="slidenum">
+              <a:rPr lang="en-US" smtClean="0"/>
               <a:t>‹#›</a:t>
             </a:fld>
             <a:endParaRPr lang="en-US"/>
@@ -2691,10 +2674,9 @@
             </a:lvl1pPr>
           </a:lstStyle>
           <a:p>
-            <a:fld id="{019CE01B-3B9E-4A7F-A55B-653F84DA3CBA}" type="datetimeFigureOut">
-              <a:rPr lang="en-US" smtClean="0"/>
-              <a:pPr/>
-              <a:t>4/18/2016</a:t>
+            <a:fld id="{6094FE82-722D-421B-BB2B-D10D66F0ABDE}" type="datetimeFigureOut">
+              <a:rPr lang="en-US" smtClean="0"/>
+              <a:t>5/1/2016</a:t>
             </a:fld>
             <a:endParaRPr lang="en-US"/>
           </a:p>
@@ -2770,9 +2752,8 @@
             </a:lvl1pPr>
           </a:lstStyle>
           <a:p>
-            <a:fld id="{ABD7AE9B-FCC5-4EA7-A6B4-B26DC566E1E4}" type="slidenum">
-              <a:rPr lang="en-US" smtClean="0"/>
-              <a:pPr/>
+            <a:fld id="{8B2E62DC-5ACB-4AD4-BAE6-906CF64556E6}" type="slidenum">
+              <a:rPr lang="en-US" smtClean="0"/>
               <a:t>‹#›</a:t>
             </a:fld>
             <a:endParaRPr lang="en-US"/>
@@ -3103,7 +3084,324 @@
           <a:bodyPr/>
           <a:lstStyle/>
           <a:p>
-            <a:endParaRPr lang="en-US"/>
+            <a:r>
+              <a:rPr lang="en-US" dirty="0" smtClean="0"/>
+              <a:t>Java as you wished it would be</a:t>
+            </a:r>
+            <a:endParaRPr lang="en-US" dirty="0"/>
+          </a:p>
+        </p:txBody>
+      </p:sp>
+    </p:spTree>
+  </p:cSld>
+  <p:clrMapOvr>
+    <a:masterClrMapping/>
+  </p:clrMapOvr>
+</p:sld>
+</file>
+
+<file path=ppt/slides/slide10.xml><?xml version="1.0" encoding="utf-8"?>
+<p:sld xmlns:a="http://schemas.openxmlformats.org/drawingml/2006/main" xmlns:r="http://schemas.openxmlformats.org/officeDocument/2006/relationships" xmlns:p="http://schemas.openxmlformats.org/presentationml/2006/main">
+  <p:cSld>
+    <p:spTree>
+      <p:nvGrpSpPr>
+        <p:cNvPr id="1" name=""/>
+        <p:cNvGrpSpPr/>
+        <p:nvPr/>
+      </p:nvGrpSpPr>
+      <p:grpSpPr>
+        <a:xfrm>
+          <a:off x="0" y="0"/>
+          <a:ext cx="0" cy="0"/>
+          <a:chOff x="0" y="0"/>
+          <a:chExt cx="0" cy="0"/>
+        </a:xfrm>
+      </p:grpSpPr>
+      <p:sp>
+        <p:nvSpPr>
+          <p:cNvPr id="2" name="Title 1"/>
+          <p:cNvSpPr>
+            <a:spLocks noGrp="1"/>
+          </p:cNvSpPr>
+          <p:nvPr>
+            <p:ph type="title"/>
+          </p:nvPr>
+        </p:nvSpPr>
+        <p:spPr/>
+        <p:txBody>
+          <a:bodyPr/>
+          <a:lstStyle/>
+          <a:p>
+            <a:r>
+              <a:rPr lang="en-US" dirty="0" smtClean="0"/>
+              <a:t>Basics: Case Classes</a:t>
+            </a:r>
+            <a:endParaRPr lang="en-US" dirty="0"/>
+          </a:p>
+        </p:txBody>
+      </p:sp>
+      <p:sp>
+        <p:nvSpPr>
+          <p:cNvPr id="3" name="Content Placeholder 2"/>
+          <p:cNvSpPr>
+            <a:spLocks noGrp="1"/>
+          </p:cNvSpPr>
+          <p:nvPr>
+            <p:ph idx="1"/>
+          </p:nvPr>
+        </p:nvSpPr>
+        <p:spPr/>
+        <p:txBody>
+          <a:bodyPr/>
+          <a:lstStyle/>
+          <a:p>
+            <a:r>
+              <a:rPr lang="en-US" dirty="0" smtClean="0"/>
+              <a:t>Immutable</a:t>
+            </a:r>
+          </a:p>
+          <a:p>
+            <a:r>
+              <a:rPr lang="en-US" dirty="0" smtClean="0"/>
+              <a:t>Provide some basic functionality</a:t>
+            </a:r>
+          </a:p>
+          <a:p>
+            <a:pPr lvl="1"/>
+            <a:r>
+              <a:rPr lang="en-US" dirty="0" err="1" smtClean="0"/>
+              <a:t>toString</a:t>
+            </a:r>
+            <a:r>
+              <a:rPr lang="en-US" dirty="0" smtClean="0"/>
+              <a:t>()</a:t>
+            </a:r>
+          </a:p>
+          <a:p>
+            <a:pPr lvl="1"/>
+            <a:r>
+              <a:rPr lang="en-US" dirty="0" smtClean="0"/>
+              <a:t>copy()</a:t>
+            </a:r>
+          </a:p>
+          <a:p>
+            <a:pPr lvl="1"/>
+            <a:r>
+              <a:rPr lang="en-US" dirty="0" smtClean="0"/>
+              <a:t>==</a:t>
+            </a:r>
+          </a:p>
+          <a:p>
+            <a:pPr>
+              <a:buNone/>
+            </a:pPr>
+            <a:endParaRPr lang="en-US" dirty="0"/>
+          </a:p>
+        </p:txBody>
+      </p:sp>
+    </p:spTree>
+  </p:cSld>
+  <p:clrMapOvr>
+    <a:masterClrMapping/>
+  </p:clrMapOvr>
+</p:sld>
+</file>
+
+<file path=ppt/slides/slide11.xml><?xml version="1.0" encoding="utf-8"?>
+<p:sld xmlns:a="http://schemas.openxmlformats.org/drawingml/2006/main" xmlns:r="http://schemas.openxmlformats.org/officeDocument/2006/relationships" xmlns:p="http://schemas.openxmlformats.org/presentationml/2006/main">
+  <p:cSld>
+    <p:spTree>
+      <p:nvGrpSpPr>
+        <p:cNvPr id="1" name=""/>
+        <p:cNvGrpSpPr/>
+        <p:nvPr/>
+      </p:nvGrpSpPr>
+      <p:grpSpPr>
+        <a:xfrm>
+          <a:off x="0" y="0"/>
+          <a:ext cx="0" cy="0"/>
+          <a:chOff x="0" y="0"/>
+          <a:chExt cx="0" cy="0"/>
+        </a:xfrm>
+      </p:grpSpPr>
+      <p:sp>
+        <p:nvSpPr>
+          <p:cNvPr id="2" name="Title 1"/>
+          <p:cNvSpPr>
+            <a:spLocks noGrp="1"/>
+          </p:cNvSpPr>
+          <p:nvPr>
+            <p:ph type="title"/>
+          </p:nvPr>
+        </p:nvSpPr>
+        <p:spPr/>
+        <p:txBody>
+          <a:bodyPr/>
+          <a:lstStyle/>
+          <a:p>
+            <a:r>
+              <a:rPr lang="en-US" dirty="0" smtClean="0"/>
+              <a:t>Basics: </a:t>
+            </a:r>
+            <a:r>
+              <a:rPr lang="en-US" dirty="0" err="1" smtClean="0"/>
+              <a:t>Tuple</a:t>
+            </a:r>
+            <a:endParaRPr lang="en-US" dirty="0"/>
+          </a:p>
+        </p:txBody>
+      </p:sp>
+      <p:sp>
+        <p:nvSpPr>
+          <p:cNvPr id="3" name="Content Placeholder 2"/>
+          <p:cNvSpPr>
+            <a:spLocks noGrp="1"/>
+          </p:cNvSpPr>
+          <p:nvPr>
+            <p:ph idx="1"/>
+          </p:nvPr>
+        </p:nvSpPr>
+        <p:spPr/>
+        <p:txBody>
+          <a:bodyPr/>
+          <a:lstStyle/>
+          <a:p>
+            <a:r>
+              <a:rPr lang="en-US" dirty="0"/>
+              <a:t>immutable sequence of values of multiple </a:t>
+            </a:r>
+            <a:r>
+              <a:rPr lang="en-US" dirty="0" smtClean="0"/>
+              <a:t>types</a:t>
+            </a:r>
+          </a:p>
+          <a:p>
+            <a:pPr>
+              <a:buNone/>
+            </a:pPr>
+            <a:endParaRPr lang="en-US" dirty="0"/>
+          </a:p>
+          <a:p>
+            <a:pPr>
+              <a:buNone/>
+            </a:pPr>
+            <a:r>
+              <a:rPr lang="en-US" b="1" dirty="0"/>
+              <a:t>val</a:t>
+            </a:r>
+            <a:r>
+              <a:rPr lang="en-US" dirty="0" smtClean="0"/>
+              <a:t>   idUsername </a:t>
+            </a:r>
+            <a:r>
+              <a:rPr lang="en-US" b="1" dirty="0"/>
+              <a:t>=</a:t>
+            </a:r>
+            <a:r>
+              <a:rPr lang="en-US" dirty="0" smtClean="0"/>
+              <a:t> </a:t>
+            </a:r>
+            <a:r>
+              <a:rPr lang="en-US" dirty="0" smtClean="0"/>
+              <a:t>( “</a:t>
+            </a:r>
+            <a:r>
+              <a:rPr lang="en-US" dirty="0" err="1" smtClean="0"/>
+              <a:t>VasjaBu</a:t>
+            </a:r>
+            <a:r>
+              <a:rPr lang="en-US" dirty="0" smtClean="0"/>
+              <a:t>“, 1990-04-23)</a:t>
+            </a:r>
+            <a:endParaRPr lang="en-US" dirty="0" smtClean="0"/>
+          </a:p>
+          <a:p>
+            <a:pPr>
+              <a:buNone/>
+            </a:pPr>
+            <a:endParaRPr lang="en-US" dirty="0"/>
+          </a:p>
+          <a:p>
+            <a:pPr>
+              <a:buNone/>
+            </a:pPr>
+            <a:endParaRPr lang="en-US" dirty="0"/>
+          </a:p>
+        </p:txBody>
+      </p:sp>
+    </p:spTree>
+  </p:cSld>
+  <p:clrMapOvr>
+    <a:masterClrMapping/>
+  </p:clrMapOvr>
+</p:sld>
+</file>
+
+<file path=ppt/slides/slide12.xml><?xml version="1.0" encoding="utf-8"?>
+<p:sld xmlns:a="http://schemas.openxmlformats.org/drawingml/2006/main" xmlns:r="http://schemas.openxmlformats.org/officeDocument/2006/relationships" xmlns:p="http://schemas.openxmlformats.org/presentationml/2006/main">
+  <p:cSld>
+    <p:spTree>
+      <p:nvGrpSpPr>
+        <p:cNvPr id="1" name=""/>
+        <p:cNvGrpSpPr/>
+        <p:nvPr/>
+      </p:nvGrpSpPr>
+      <p:grpSpPr>
+        <a:xfrm>
+          <a:off x="0" y="0"/>
+          <a:ext cx="0" cy="0"/>
+          <a:chOff x="0" y="0"/>
+          <a:chExt cx="0" cy="0"/>
+        </a:xfrm>
+      </p:grpSpPr>
+      <p:sp>
+        <p:nvSpPr>
+          <p:cNvPr id="2" name="Title 1"/>
+          <p:cNvSpPr>
+            <a:spLocks noGrp="1"/>
+          </p:cNvSpPr>
+          <p:nvPr>
+            <p:ph type="title"/>
+          </p:nvPr>
+        </p:nvSpPr>
+        <p:spPr/>
+        <p:txBody>
+          <a:bodyPr/>
+          <a:lstStyle/>
+          <a:p>
+            <a:r>
+              <a:rPr lang="en-US" dirty="0" smtClean="0"/>
+              <a:t>Case-classes++</a:t>
+            </a:r>
+            <a:endParaRPr lang="en-US" dirty="0"/>
+          </a:p>
+        </p:txBody>
+      </p:sp>
+      <p:sp>
+        <p:nvSpPr>
+          <p:cNvPr id="3" name="Content Placeholder 2"/>
+          <p:cNvSpPr>
+            <a:spLocks noGrp="1"/>
+          </p:cNvSpPr>
+          <p:nvPr>
+            <p:ph idx="1"/>
+          </p:nvPr>
+        </p:nvSpPr>
+        <p:spPr/>
+        <p:txBody>
+          <a:bodyPr/>
+          <a:lstStyle/>
+          <a:p>
+            <a:r>
+              <a:rPr lang="en-US" dirty="0" smtClean="0"/>
+              <a:t>Pattern-matching</a:t>
+            </a:r>
+          </a:p>
+          <a:p>
+            <a:r>
+              <a:rPr lang="en-US" dirty="0" smtClean="0"/>
+              <a:t>Functions</a:t>
+            </a:r>
           </a:p>
         </p:txBody>
       </p:sp>
@@ -3149,7 +3447,7 @@
           <a:p>
             <a:r>
               <a:rPr lang="en-US" dirty="0" smtClean="0"/>
-              <a:t>Basics</a:t>
+              <a:t>Java-based</a:t>
             </a:r>
             <a:endParaRPr lang="en-US" dirty="0"/>
           </a:p>
@@ -3167,100 +3465,39 @@
         </p:nvSpPr>
         <p:spPr/>
         <p:txBody>
-          <a:bodyPr>
-            <a:normAutofit fontScale="85000" lnSpcReduction="20000"/>
-          </a:bodyPr>
-          <a:lstStyle/>
-          <a:p>
-            <a:r>
-              <a:rPr lang="en-US" dirty="0" smtClean="0"/>
-              <a:t>Object-oriented</a:t>
-            </a:r>
-          </a:p>
-          <a:p>
-            <a:pPr lvl="1"/>
-            <a:r>
-              <a:rPr lang="en-US" dirty="0" smtClean="0"/>
-              <a:t>Every value is an object</a:t>
-            </a:r>
-          </a:p>
-          <a:p>
-            <a:pPr lvl="2"/>
-            <a:r>
-              <a:rPr lang="en-US" dirty="0" smtClean="0"/>
-              <a:t>primitives</a:t>
-            </a:r>
-          </a:p>
-          <a:p>
-            <a:pPr lvl="2"/>
-            <a:r>
-              <a:rPr lang="en-US" dirty="0" smtClean="0"/>
-              <a:t>functions</a:t>
-            </a:r>
-          </a:p>
-          <a:p>
-            <a:pPr lvl="2"/>
-            <a:r>
-              <a:rPr lang="en-US" dirty="0" smtClean="0"/>
-              <a:t>“empty-value”</a:t>
-            </a:r>
-          </a:p>
-          <a:p>
-            <a:r>
-              <a:rPr lang="en-US" dirty="0" smtClean="0"/>
-              <a:t>Functional</a:t>
-            </a:r>
-          </a:p>
-          <a:p>
-            <a:pPr lvl="1"/>
-            <a:r>
-              <a:rPr lang="en-US" dirty="0" smtClean="0"/>
-              <a:t>Every function is a value</a:t>
-            </a:r>
-          </a:p>
-          <a:p>
-            <a:pPr lvl="2"/>
-            <a:r>
-              <a:rPr lang="en-US" dirty="0" smtClean="0"/>
-              <a:t>Anonymous functions</a:t>
-            </a:r>
-          </a:p>
-          <a:p>
-            <a:pPr lvl="2"/>
-            <a:r>
-              <a:rPr lang="en-US" dirty="0" smtClean="0"/>
-              <a:t>Higher-order functions</a:t>
-            </a:r>
-          </a:p>
-          <a:p>
-            <a:pPr lvl="2"/>
-            <a:r>
-              <a:rPr lang="en-US" dirty="0" smtClean="0"/>
-              <a:t>Case-classes</a:t>
-            </a:r>
-          </a:p>
-          <a:p>
-            <a:pPr lvl="2"/>
-            <a:r>
-              <a:rPr lang="en-US" dirty="0" smtClean="0"/>
-              <a:t>Pattern matching</a:t>
-            </a:r>
-          </a:p>
-          <a:p>
-            <a:r>
-              <a:rPr lang="en-US" dirty="0" smtClean="0"/>
-              <a:t>Statically typed</a:t>
-            </a:r>
-          </a:p>
-          <a:p>
-            <a:pPr lvl="1"/>
-            <a:r>
-              <a:rPr lang="en-US" dirty="0" smtClean="0"/>
-              <a:t>Generics++ (Cage[Lion] can extend Cage[Animal])</a:t>
-            </a:r>
-          </a:p>
-          <a:p>
+          <a:bodyPr/>
+          <a:lstStyle/>
+          <a:p>
+            <a:r>
+              <a:rPr lang="en-US" dirty="0" smtClean="0"/>
+              <a:t>Conceived in 2001 by one of the main authors of Java</a:t>
+            </a:r>
+          </a:p>
+          <a:p>
+            <a:r>
+              <a:rPr lang="en-US" dirty="0" smtClean="0"/>
+              <a:t>Runs on JVM</a:t>
+            </a:r>
+          </a:p>
+          <a:p>
+            <a:r>
+              <a:rPr lang="en-US" dirty="0" smtClean="0"/>
+              <a:t>Compiles into </a:t>
+            </a:r>
+            <a:r>
+              <a:rPr lang="en-US" dirty="0" err="1" smtClean="0"/>
+              <a:t>bytecode</a:t>
+            </a:r>
             <a:endParaRPr lang="en-US" dirty="0" smtClean="0"/>
+          </a:p>
+          <a:p>
+            <a:r>
+              <a:rPr lang="en-US" dirty="0" smtClean="0"/>
+              <a:t>Full interoperability with Java</a:t>
+            </a:r>
+          </a:p>
+          <a:p>
+            <a:endParaRPr lang="en-US" dirty="0"/>
           </a:p>
         </p:txBody>
       </p:sp>
@@ -3306,7 +3543,7 @@
           <a:p>
             <a:r>
               <a:rPr lang="en-US" dirty="0" smtClean="0"/>
-              <a:t>Main Design Principles</a:t>
+              <a:t>Object-oriented</a:t>
             </a:r>
             <a:endParaRPr lang="en-US" dirty="0"/>
           </a:p>
@@ -3329,45 +3566,29 @@
           <a:p>
             <a:r>
               <a:rPr lang="en-US" dirty="0" smtClean="0"/>
-              <a:t>Strive for immutability</a:t>
+              <a:t>Every value is an object</a:t>
             </a:r>
           </a:p>
           <a:p>
             <a:pPr lvl="1"/>
             <a:r>
-              <a:rPr lang="en-US" dirty="0" err="1" smtClean="0"/>
-              <a:t>val</a:t>
-            </a:r>
-            <a:endParaRPr lang="en-US" dirty="0" smtClean="0"/>
+              <a:rPr lang="en-US" dirty="0" smtClean="0"/>
+              <a:t>Primitives</a:t>
+            </a:r>
           </a:p>
           <a:p>
             <a:pPr lvl="1"/>
             <a:r>
               <a:rPr lang="en-US" dirty="0" smtClean="0"/>
-              <a:t>immutable collections</a:t>
+              <a:t>Functions</a:t>
             </a:r>
           </a:p>
           <a:p>
             <a:pPr lvl="1"/>
             <a:r>
               <a:rPr lang="en-US" dirty="0" smtClean="0"/>
-              <a:t>you can still work in a usual way, if you’re so inclined</a:t>
-            </a:r>
-          </a:p>
-          <a:p>
-            <a:r>
-              <a:rPr lang="en-US" dirty="0" smtClean="0"/>
-              <a:t>Everything is an expression</a:t>
-            </a:r>
-          </a:p>
-          <a:p>
-            <a:pPr lvl="1"/>
-            <a:r>
-              <a:rPr lang="en-US" dirty="0" smtClean="0"/>
-              <a:t>no ifs, no buts</a:t>
-            </a:r>
-          </a:p>
-          <a:p>
+              <a:t>“Empty” value </a:t>
+            </a:r>
             <a:endParaRPr lang="en-US" dirty="0"/>
           </a:p>
         </p:txBody>
@@ -3397,161 +3618,29 @@
           <a:chExt cx="0" cy="0"/>
         </a:xfrm>
       </p:grpSpPr>
-      <p:sp>
-        <p:nvSpPr>
-          <p:cNvPr id="2" name="Title 1"/>
-          <p:cNvSpPr>
-            <a:spLocks noGrp="1"/>
-          </p:cNvSpPr>
-          <p:nvPr>
-            <p:ph type="title"/>
-          </p:nvPr>
-        </p:nvSpPr>
-        <p:spPr/>
-        <p:txBody>
-          <a:bodyPr/>
-          <a:lstStyle/>
-          <a:p>
-            <a:r>
-              <a:rPr lang="en-US" dirty="0" smtClean="0"/>
-              <a:t>Basics: </a:t>
-            </a:r>
-            <a:r>
-              <a:rPr lang="en-US" dirty="0" err="1" smtClean="0"/>
-              <a:t>Scala</a:t>
-            </a:r>
-            <a:r>
-              <a:rPr lang="en-US" dirty="0" smtClean="0"/>
-              <a:t> Beans</a:t>
-            </a:r>
-            <a:endParaRPr lang="en-US" dirty="0"/>
-          </a:p>
-        </p:txBody>
-      </p:sp>
-      <p:sp>
-        <p:nvSpPr>
-          <p:cNvPr id="3" name="Content Placeholder 2"/>
-          <p:cNvSpPr>
-            <a:spLocks noGrp="1"/>
-          </p:cNvSpPr>
+      <p:pic>
+        <p:nvPicPr>
+          <p:cNvPr id="4" name="Content Placeholder 3" descr="classhierarchy.png"/>
+          <p:cNvPicPr>
+            <a:picLocks noGrp="1" noChangeAspect="1"/>
+          </p:cNvPicPr>
           <p:nvPr>
             <p:ph idx="1"/>
           </p:nvPr>
-        </p:nvSpPr>
-        <p:spPr/>
-        <p:txBody>
-          <a:bodyPr>
-            <a:normAutofit lnSpcReduction="10000"/>
-          </a:bodyPr>
-          <a:lstStyle/>
-          <a:p>
-            <a:r>
-              <a:rPr lang="en-US" dirty="0" smtClean="0"/>
-              <a:t>Class (same old stuff, but POJOs are leaner</a:t>
-            </a:r>
-          </a:p>
-          <a:p>
-            <a:pPr lvl="1"/>
-            <a:r>
-              <a:rPr lang="en-US" dirty="0" smtClean="0"/>
-              <a:t>No </a:t>
-            </a:r>
-            <a:r>
-              <a:rPr lang="en-US" dirty="0" smtClean="0"/>
-              <a:t>need for </a:t>
-            </a:r>
-            <a:r>
-              <a:rPr lang="en-US" dirty="0" err="1" smtClean="0"/>
-              <a:t>accessors</a:t>
-            </a:r>
-            <a:r>
-              <a:rPr lang="en-US" dirty="0" smtClean="0"/>
-              <a:t>/</a:t>
-            </a:r>
-            <a:r>
-              <a:rPr lang="en-US" dirty="0" err="1" smtClean="0"/>
-              <a:t>mutator</a:t>
-            </a:r>
-            <a:r>
-              <a:rPr lang="en-US" dirty="0" smtClean="0"/>
-              <a:t> - can </a:t>
-            </a:r>
-            <a:r>
-              <a:rPr lang="en-US" dirty="0" smtClean="0"/>
-              <a:t>be added on the </a:t>
-            </a:r>
-            <a:r>
-              <a:rPr lang="en-US" dirty="0" smtClean="0"/>
-              <a:t>fly</a:t>
-            </a:r>
-          </a:p>
-          <a:p>
-            <a:r>
-              <a:rPr lang="en-US" dirty="0" smtClean="0"/>
-              <a:t>Object </a:t>
-            </a:r>
-          </a:p>
-          <a:p>
-            <a:pPr lvl="1"/>
-            <a:r>
-              <a:rPr lang="en-US" dirty="0" smtClean="0"/>
-              <a:t>singleton of a class</a:t>
-            </a:r>
-          </a:p>
-          <a:p>
-            <a:pPr lvl="1"/>
-            <a:r>
-              <a:rPr lang="en-US" dirty="0" smtClean="0"/>
-              <a:t>cute way of being static</a:t>
-            </a:r>
-          </a:p>
-          <a:p>
-            <a:r>
-              <a:rPr lang="en-US" dirty="0" smtClean="0"/>
-              <a:t>Trait (</a:t>
-            </a:r>
-            <a:r>
-              <a:rPr lang="en-US" dirty="0" smtClean="0"/>
-              <a:t>interface a-la java8)</a:t>
-            </a:r>
-          </a:p>
-          <a:p>
-            <a:pPr lvl="1"/>
-            <a:r>
-              <a:rPr lang="en-US" dirty="0" smtClean="0"/>
-              <a:t>Actually, rather a </a:t>
-            </a:r>
-            <a:r>
-              <a:rPr lang="en-US" dirty="0" err="1" smtClean="0"/>
-              <a:t>mixin</a:t>
-            </a:r>
-            <a:endParaRPr lang="en-US" dirty="0" smtClean="0"/>
-          </a:p>
-          <a:p>
-            <a:pPr lvl="1"/>
-            <a:r>
-              <a:rPr lang="en-US" smtClean="0"/>
-              <a:t>S</a:t>
-            </a:r>
-            <a:r>
-              <a:rPr lang="en-US" smtClean="0"/>
-              <a:t>upports </a:t>
-            </a:r>
-            <a:r>
-              <a:rPr lang="en-US" dirty="0" smtClean="0"/>
-              <a:t>inheritance of state</a:t>
-            </a:r>
-          </a:p>
-          <a:p>
-            <a:pPr lvl="1"/>
-            <a:endParaRPr lang="en-US" dirty="0" smtClean="0"/>
-          </a:p>
-          <a:p>
-            <a:pPr lvl="1"/>
-            <a:endParaRPr lang="en-US" dirty="0" smtClean="0"/>
-          </a:p>
-        </p:txBody>
-      </p:sp>
+        </p:nvPicPr>
+        <p:blipFill>
+          <a:blip r:embed="rId2" cstate="print"/>
+          <a:stretch>
+            <a:fillRect/>
+          </a:stretch>
+        </p:blipFill>
+        <p:spPr>
+          <a:xfrm>
+            <a:off x="251519" y="332656"/>
+            <a:ext cx="8789883" cy="5832648"/>
+          </a:xfrm>
+        </p:spPr>
+      </p:pic>
     </p:spTree>
   </p:cSld>
   <p:clrMapOvr>
@@ -3594,7 +3683,7 @@
           <a:p>
             <a:r>
               <a:rPr lang="en-US" dirty="0" smtClean="0"/>
-              <a:t>Basics: Case Classes</a:t>
+              <a:t>Functional</a:t>
             </a:r>
             <a:endParaRPr lang="en-US" dirty="0"/>
           </a:p>
@@ -3617,44 +3706,28 @@
           <a:p>
             <a:r>
               <a:rPr lang="en-US" dirty="0" smtClean="0"/>
-              <a:t>Immutable</a:t>
-            </a:r>
-          </a:p>
-          <a:p>
-            <a:r>
-              <a:rPr lang="en-US" dirty="0" smtClean="0"/>
-              <a:t>Provide some basic functionality</a:t>
-            </a:r>
-          </a:p>
-          <a:p>
-            <a:pPr lvl="1"/>
-            <a:r>
-              <a:rPr lang="en-US" dirty="0" err="1" smtClean="0"/>
-              <a:t>toString</a:t>
-            </a:r>
-            <a:r>
-              <a:rPr lang="en-US" dirty="0" smtClean="0"/>
-              <a:t>()</a:t>
-            </a:r>
-          </a:p>
-          <a:p>
-            <a:pPr lvl="1"/>
-            <a:r>
-              <a:rPr lang="en-US" dirty="0" smtClean="0"/>
-              <a:t>copy()</a:t>
-            </a:r>
-          </a:p>
-          <a:p>
-            <a:pPr lvl="1"/>
-            <a:r>
-              <a:rPr lang="en-US" dirty="0" smtClean="0"/>
-              <a:t>==</a:t>
-            </a:r>
-          </a:p>
-          <a:p>
-            <a:pPr>
-              <a:buNone/>
-            </a:pPr>
+              <a:t>Higher-order functions</a:t>
+            </a:r>
+          </a:p>
+          <a:p>
+            <a:r>
+              <a:rPr lang="en-US" dirty="0" smtClean="0"/>
+              <a:t>Nested-functions</a:t>
+            </a:r>
+          </a:p>
+          <a:p>
+            <a:r>
+              <a:rPr lang="en-US" dirty="0" smtClean="0"/>
+              <a:t>Currying</a:t>
+            </a:r>
+          </a:p>
+          <a:p>
+            <a:r>
+              <a:rPr lang="en-US" dirty="0" smtClean="0"/>
+              <a:t>Anonymous functions definitions</a:t>
+            </a:r>
+          </a:p>
+          <a:p>
             <a:endParaRPr lang="en-US" dirty="0"/>
           </a:p>
         </p:txBody>
@@ -3696,16 +3769,14 @@
         </p:nvSpPr>
         <p:spPr/>
         <p:txBody>
-          <a:bodyPr/>
-          <a:lstStyle/>
-          <a:p>
-            <a:r>
-              <a:rPr lang="en-US" dirty="0" smtClean="0"/>
-              <a:t>Basics: </a:t>
-            </a:r>
-            <a:r>
-              <a:rPr lang="en-US" dirty="0" err="1" smtClean="0"/>
-              <a:t>Tuple</a:t>
+          <a:bodyPr>
+            <a:normAutofit/>
+          </a:bodyPr>
+          <a:lstStyle/>
+          <a:p>
+            <a:r>
+              <a:rPr lang="en-US" dirty="0" smtClean="0"/>
+              <a:t>Strictly-typed</a:t>
             </a:r>
             <a:endParaRPr lang="en-US" dirty="0"/>
           </a:p>
@@ -3726,47 +3797,40 @@
           <a:bodyPr/>
           <a:lstStyle/>
           <a:p>
+            <a:pPr marL="342900" lvl="1" indent="-342900">
+              <a:buFont typeface="Arial" pitchFamily="34" charset="0"/>
+              <a:buChar char="•"/>
+            </a:pPr>
+            <a:r>
+              <a:rPr lang="en-US" dirty="0" smtClean="0"/>
+              <a:t>Generics++ (Cage[Lion] can extend Cage[Animal])</a:t>
+            </a:r>
+          </a:p>
+          <a:p>
+            <a:pPr marL="742950" lvl="2" indent="-342900"/>
             <a:r>
               <a:rPr lang="en-US" dirty="0"/>
-              <a:t>immutable sequence of values of multiple </a:t>
-            </a:r>
-            <a:r>
-              <a:rPr lang="en-US" dirty="0" smtClean="0"/>
-              <a:t>types</a:t>
-            </a:r>
-          </a:p>
-          <a:p>
-            <a:pPr>
-              <a:buNone/>
+              <a:t>List[+A]</a:t>
+            </a:r>
+            <a:endParaRPr lang="en-US" dirty="0" smtClean="0"/>
+          </a:p>
+          <a:p>
+            <a:pPr marL="742950" lvl="2" indent="-342900"/>
+            <a:r>
+              <a:rPr lang="en-US" dirty="0" err="1"/>
+              <a:t>ListBuffer</a:t>
+            </a:r>
+            <a:r>
+              <a:rPr lang="en-US" dirty="0"/>
+              <a:t>[A]</a:t>
+            </a:r>
+          </a:p>
+          <a:p>
+            <a:pPr marL="342900" lvl="1" indent="-342900">
+              <a:buFont typeface="Arial" pitchFamily="34" charset="0"/>
+              <a:buChar char="•"/>
             </a:pPr>
-            <a:endParaRPr lang="en-US" dirty="0"/>
-          </a:p>
-          <a:p>
-            <a:pPr>
-              <a:buNone/>
-            </a:pPr>
-            <a:r>
-              <a:rPr lang="en-US" b="1" dirty="0"/>
-              <a:t>val</a:t>
-            </a:r>
-            <a:r>
-              <a:rPr lang="en-US" dirty="0" smtClean="0"/>
-              <a:t>   idUsername </a:t>
-            </a:r>
-            <a:r>
-              <a:rPr lang="en-US" b="1" dirty="0"/>
-              <a:t>=</a:t>
-            </a:r>
-            <a:r>
-              <a:rPr lang="en-US" dirty="0" smtClean="0"/>
-              <a:t> (123, “VasjaBu")</a:t>
-            </a:r>
-          </a:p>
-          <a:p>
-            <a:pPr>
-              <a:buNone/>
-            </a:pPr>
-            <a:endParaRPr lang="en-US" dirty="0"/>
+            <a:endParaRPr lang="en-US" dirty="0" smtClean="0"/>
           </a:p>
           <a:p>
             <a:pPr>
@@ -3818,7 +3882,7 @@
           <a:p>
             <a:r>
               <a:rPr lang="en-US" dirty="0" smtClean="0"/>
-              <a:t>Case-classes++</a:t>
+              <a:t>Main Design Principles</a:t>
             </a:r>
             <a:endParaRPr lang="en-US" dirty="0"/>
           </a:p>
@@ -3841,14 +3905,301 @@
           <a:p>
             <a:r>
               <a:rPr lang="en-US" dirty="0" smtClean="0"/>
-              <a:t>Pattern-matching</a:t>
-            </a:r>
-          </a:p>
-          <a:p>
-            <a:r>
-              <a:rPr lang="en-US" dirty="0" smtClean="0"/>
-              <a:t>Functions</a:t>
-            </a:r>
+              <a:t>Strive for immutability</a:t>
+            </a:r>
+          </a:p>
+          <a:p>
+            <a:pPr lvl="1"/>
+            <a:r>
+              <a:rPr lang="en-US" dirty="0" err="1" smtClean="0"/>
+              <a:t>val</a:t>
+            </a:r>
+            <a:endParaRPr lang="en-US" dirty="0" smtClean="0"/>
+          </a:p>
+          <a:p>
+            <a:pPr lvl="1"/>
+            <a:r>
+              <a:rPr lang="en-US" dirty="0" smtClean="0"/>
+              <a:t>immutable collections</a:t>
+            </a:r>
+          </a:p>
+          <a:p>
+            <a:pPr lvl="1"/>
+            <a:r>
+              <a:rPr lang="en-US" dirty="0" smtClean="0"/>
+              <a:t>you can still work in a usual way, if you’re so inclined</a:t>
+            </a:r>
+          </a:p>
+          <a:p>
+            <a:r>
+              <a:rPr lang="en-US" dirty="0" smtClean="0"/>
+              <a:t>Everything is an expression</a:t>
+            </a:r>
+          </a:p>
+          <a:p>
+            <a:pPr lvl="1"/>
+            <a:r>
+              <a:rPr lang="en-US" dirty="0" smtClean="0"/>
+              <a:t>no ifs, no buts</a:t>
+            </a:r>
+          </a:p>
+          <a:p>
+            <a:endParaRPr lang="en-US" dirty="0"/>
+          </a:p>
+        </p:txBody>
+      </p:sp>
+    </p:spTree>
+  </p:cSld>
+  <p:clrMapOvr>
+    <a:masterClrMapping/>
+  </p:clrMapOvr>
+</p:sld>
+</file>
+
+<file path=ppt/slides/slide8.xml><?xml version="1.0" encoding="utf-8"?>
+<p:sld xmlns:a="http://schemas.openxmlformats.org/drawingml/2006/main" xmlns:r="http://schemas.openxmlformats.org/officeDocument/2006/relationships" xmlns:p="http://schemas.openxmlformats.org/presentationml/2006/main">
+  <p:cSld>
+    <p:spTree>
+      <p:nvGrpSpPr>
+        <p:cNvPr id="1" name=""/>
+        <p:cNvGrpSpPr/>
+        <p:nvPr/>
+      </p:nvGrpSpPr>
+      <p:grpSpPr>
+        <a:xfrm>
+          <a:off x="0" y="0"/>
+          <a:ext cx="0" cy="0"/>
+          <a:chOff x="0" y="0"/>
+          <a:chExt cx="0" cy="0"/>
+        </a:xfrm>
+      </p:grpSpPr>
+      <p:sp>
+        <p:nvSpPr>
+          <p:cNvPr id="2" name="Title 1"/>
+          <p:cNvSpPr>
+            <a:spLocks noGrp="1"/>
+          </p:cNvSpPr>
+          <p:nvPr>
+            <p:ph type="title"/>
+          </p:nvPr>
+        </p:nvSpPr>
+        <p:spPr/>
+        <p:txBody>
+          <a:bodyPr/>
+          <a:lstStyle/>
+          <a:p>
+            <a:r>
+              <a:rPr lang="en-US" dirty="0" smtClean="0"/>
+              <a:t>Syntactic sugar</a:t>
+            </a:r>
+            <a:endParaRPr lang="en-US" dirty="0"/>
+          </a:p>
+        </p:txBody>
+      </p:sp>
+      <p:sp>
+        <p:nvSpPr>
+          <p:cNvPr id="3" name="Content Placeholder 2"/>
+          <p:cNvSpPr>
+            <a:spLocks noGrp="1"/>
+          </p:cNvSpPr>
+          <p:nvPr>
+            <p:ph idx="1"/>
+          </p:nvPr>
+        </p:nvSpPr>
+        <p:spPr/>
+        <p:txBody>
+          <a:bodyPr/>
+          <a:lstStyle/>
+          <a:p>
+            <a:r>
+              <a:rPr lang="en-US" dirty="0" smtClean="0"/>
+              <a:t>No ;</a:t>
+            </a:r>
+          </a:p>
+          <a:p>
+            <a:r>
+              <a:rPr lang="en-US" dirty="0" smtClean="0"/>
+              <a:t>No returns</a:t>
+            </a:r>
+          </a:p>
+          <a:p>
+            <a:r>
+              <a:rPr lang="en-US" dirty="0" err="1" smtClean="0"/>
+              <a:t>a.apply</a:t>
+            </a:r>
+            <a:r>
+              <a:rPr lang="en-US" dirty="0" smtClean="0"/>
+              <a:t>(x, y) -&gt; a(x, y)</a:t>
+            </a:r>
+          </a:p>
+          <a:p>
+            <a:endParaRPr lang="en-US" dirty="0"/>
+          </a:p>
+        </p:txBody>
+      </p:sp>
+    </p:spTree>
+  </p:cSld>
+  <p:clrMapOvr>
+    <a:masterClrMapping/>
+  </p:clrMapOvr>
+</p:sld>
+</file>
+
+<file path=ppt/slides/slide9.xml><?xml version="1.0" encoding="utf-8"?>
+<p:sld xmlns:a="http://schemas.openxmlformats.org/drawingml/2006/main" xmlns:r="http://schemas.openxmlformats.org/officeDocument/2006/relationships" xmlns:p="http://schemas.openxmlformats.org/presentationml/2006/main">
+  <p:cSld>
+    <p:spTree>
+      <p:nvGrpSpPr>
+        <p:cNvPr id="1" name=""/>
+        <p:cNvGrpSpPr/>
+        <p:nvPr/>
+      </p:nvGrpSpPr>
+      <p:grpSpPr>
+        <a:xfrm>
+          <a:off x="0" y="0"/>
+          <a:ext cx="0" cy="0"/>
+          <a:chOff x="0" y="0"/>
+          <a:chExt cx="0" cy="0"/>
+        </a:xfrm>
+      </p:grpSpPr>
+      <p:sp>
+        <p:nvSpPr>
+          <p:cNvPr id="2" name="Title 1"/>
+          <p:cNvSpPr>
+            <a:spLocks noGrp="1"/>
+          </p:cNvSpPr>
+          <p:nvPr>
+            <p:ph type="title"/>
+          </p:nvPr>
+        </p:nvSpPr>
+        <p:spPr/>
+        <p:txBody>
+          <a:bodyPr/>
+          <a:lstStyle/>
+          <a:p>
+            <a:r>
+              <a:rPr lang="en-US" dirty="0" smtClean="0"/>
+              <a:t>Basics: </a:t>
+            </a:r>
+            <a:r>
+              <a:rPr lang="en-US" dirty="0" err="1" smtClean="0"/>
+              <a:t>Scala</a:t>
+            </a:r>
+            <a:r>
+              <a:rPr lang="en-US" dirty="0" smtClean="0"/>
+              <a:t> Beans</a:t>
+            </a:r>
+            <a:endParaRPr lang="en-US" dirty="0"/>
+          </a:p>
+        </p:txBody>
+      </p:sp>
+      <p:sp>
+        <p:nvSpPr>
+          <p:cNvPr id="3" name="Content Placeholder 2"/>
+          <p:cNvSpPr>
+            <a:spLocks noGrp="1"/>
+          </p:cNvSpPr>
+          <p:nvPr>
+            <p:ph idx="1"/>
+          </p:nvPr>
+        </p:nvSpPr>
+        <p:spPr/>
+        <p:txBody>
+          <a:bodyPr>
+            <a:normAutofit fontScale="92500" lnSpcReduction="10000"/>
+          </a:bodyPr>
+          <a:lstStyle/>
+          <a:p>
+            <a:r>
+              <a:rPr lang="en-US" dirty="0" smtClean="0"/>
+              <a:t>Class (same old stuff, but POJOs are leaner</a:t>
+            </a:r>
+          </a:p>
+          <a:p>
+            <a:pPr lvl="1"/>
+            <a:r>
+              <a:rPr lang="en-US" dirty="0" smtClean="0"/>
+              <a:t>No need for </a:t>
+            </a:r>
+            <a:r>
+              <a:rPr lang="en-US" dirty="0" err="1" smtClean="0"/>
+              <a:t>accessors</a:t>
+            </a:r>
+            <a:r>
+              <a:rPr lang="en-US" dirty="0" smtClean="0"/>
+              <a:t>/</a:t>
+            </a:r>
+            <a:r>
+              <a:rPr lang="en-US" dirty="0" err="1" smtClean="0"/>
+              <a:t>mutator</a:t>
+            </a:r>
+            <a:r>
+              <a:rPr lang="en-US" dirty="0" smtClean="0"/>
+              <a:t> - can be added on </a:t>
+            </a:r>
+            <a:r>
+              <a:rPr lang="en-US" dirty="0" smtClean="0"/>
+              <a:t>demand</a:t>
+            </a:r>
+            <a:endParaRPr lang="en-US" dirty="0" smtClean="0"/>
+          </a:p>
+          <a:p>
+            <a:r>
+              <a:rPr lang="en-US" dirty="0" smtClean="0"/>
+              <a:t>Object </a:t>
+            </a:r>
+          </a:p>
+          <a:p>
+            <a:pPr lvl="1"/>
+            <a:r>
+              <a:rPr lang="en-US" dirty="0" smtClean="0"/>
+              <a:t>singleton of a class</a:t>
+            </a:r>
+          </a:p>
+          <a:p>
+            <a:pPr lvl="1"/>
+            <a:r>
+              <a:rPr lang="en-US" dirty="0" smtClean="0"/>
+              <a:t>cute way of being static</a:t>
+            </a:r>
+          </a:p>
+          <a:p>
+            <a:r>
+              <a:rPr lang="en-US" dirty="0" smtClean="0"/>
+              <a:t>Trait (interface a-la java8)</a:t>
+            </a:r>
+          </a:p>
+          <a:p>
+            <a:pPr lvl="1"/>
+            <a:r>
+              <a:rPr lang="en-US" dirty="0" smtClean="0"/>
+              <a:t>Actually, rather a </a:t>
+            </a:r>
+            <a:r>
+              <a:rPr lang="en-US" dirty="0" err="1" smtClean="0"/>
+              <a:t>mixin</a:t>
+            </a:r>
+            <a:endParaRPr lang="en-US" dirty="0" smtClean="0"/>
+          </a:p>
+          <a:p>
+            <a:pPr lvl="1"/>
+            <a:r>
+              <a:rPr lang="en-US" dirty="0" smtClean="0"/>
+              <a:t>Multiple inheritance</a:t>
+            </a:r>
+            <a:endParaRPr lang="en-US" dirty="0" smtClean="0"/>
+          </a:p>
+          <a:p>
+            <a:pPr lvl="1"/>
+            <a:r>
+              <a:rPr lang="en-US" dirty="0" smtClean="0"/>
+              <a:t>S</a:t>
+            </a:r>
+            <a:r>
+              <a:rPr lang="en-US" dirty="0" smtClean="0"/>
+              <a:t>tate inheritance</a:t>
+            </a:r>
+            <a:endParaRPr lang="en-US" dirty="0" smtClean="0"/>
           </a:p>
         </p:txBody>
       </p:sp>

</xml_diff>